<commit_message>
Prezentacja "Roslyn - rozszerzanie możliwości kompilatora C#" - poprawki
</commit_message>
<xml_diff>
--- a/Roslyn - rozszerzanie możliwości kompilatora C#.pptx
+++ b/Roslyn - rozszerzanie możliwości kompilatora C#.pptx
@@ -846,7 +846,7 @@
           <a:p>
             <a:fld id="{81510C6D-7297-4447-BBEB-86B1A2F0C3D1}" type="datetimeFigureOut">
               <a:rPr lang="pl-PL" smtClean="0"/>
-              <a:t>21.02.2016</a:t>
+              <a:t>02.03.2016</a:t>
             </a:fld>
             <a:endParaRPr lang="pl-PL"/>
           </a:p>
@@ -1097,7 +1097,7 @@
           <a:p>
             <a:fld id="{81510C6D-7297-4447-BBEB-86B1A2F0C3D1}" type="datetimeFigureOut">
               <a:rPr lang="pl-PL" smtClean="0"/>
-              <a:t>21.02.2016</a:t>
+              <a:t>02.03.2016</a:t>
             </a:fld>
             <a:endParaRPr lang="pl-PL"/>
           </a:p>
@@ -1411,7 +1411,7 @@
           <a:p>
             <a:fld id="{81510C6D-7297-4447-BBEB-86B1A2F0C3D1}" type="datetimeFigureOut">
               <a:rPr lang="pl-PL" smtClean="0"/>
-              <a:t>21.02.2016</a:t>
+              <a:t>02.03.2016</a:t>
             </a:fld>
             <a:endParaRPr lang="pl-PL"/>
           </a:p>
@@ -1752,7 +1752,7 @@
           <a:p>
             <a:fld id="{81510C6D-7297-4447-BBEB-86B1A2F0C3D1}" type="datetimeFigureOut">
               <a:rPr lang="pl-PL" smtClean="0"/>
-              <a:t>21.02.2016</a:t>
+              <a:t>02.03.2016</a:t>
             </a:fld>
             <a:endParaRPr lang="pl-PL"/>
           </a:p>
@@ -2066,7 +2066,7 @@
           <a:p>
             <a:fld id="{81510C6D-7297-4447-BBEB-86B1A2F0C3D1}" type="datetimeFigureOut">
               <a:rPr lang="pl-PL" smtClean="0"/>
-              <a:t>21.02.2016</a:t>
+              <a:t>02.03.2016</a:t>
             </a:fld>
             <a:endParaRPr lang="pl-PL"/>
           </a:p>
@@ -2459,7 +2459,7 @@
           <a:p>
             <a:fld id="{81510C6D-7297-4447-BBEB-86B1A2F0C3D1}" type="datetimeFigureOut">
               <a:rPr lang="pl-PL" smtClean="0"/>
-              <a:t>21.02.2016</a:t>
+              <a:t>02.03.2016</a:t>
             </a:fld>
             <a:endParaRPr lang="pl-PL"/>
           </a:p>
@@ -2629,7 +2629,7 @@
           <a:p>
             <a:fld id="{81510C6D-7297-4447-BBEB-86B1A2F0C3D1}" type="datetimeFigureOut">
               <a:rPr lang="pl-PL" smtClean="0"/>
-              <a:t>21.02.2016</a:t>
+              <a:t>02.03.2016</a:t>
             </a:fld>
             <a:endParaRPr lang="pl-PL"/>
           </a:p>
@@ -2809,7 +2809,7 @@
           <a:p>
             <a:fld id="{81510C6D-7297-4447-BBEB-86B1A2F0C3D1}" type="datetimeFigureOut">
               <a:rPr lang="pl-PL" smtClean="0"/>
-              <a:t>21.02.2016</a:t>
+              <a:t>02.03.2016</a:t>
             </a:fld>
             <a:endParaRPr lang="pl-PL"/>
           </a:p>
@@ -2985,7 +2985,7 @@
           <a:p>
             <a:fld id="{81510C6D-7297-4447-BBEB-86B1A2F0C3D1}" type="datetimeFigureOut">
               <a:rPr lang="pl-PL" smtClean="0"/>
-              <a:t>21.02.2016</a:t>
+              <a:t>02.03.2016</a:t>
             </a:fld>
             <a:endParaRPr lang="pl-PL"/>
           </a:p>
@@ -3232,7 +3232,7 @@
           <a:p>
             <a:fld id="{81510C6D-7297-4447-BBEB-86B1A2F0C3D1}" type="datetimeFigureOut">
               <a:rPr lang="pl-PL" smtClean="0"/>
-              <a:t>21.02.2016</a:t>
+              <a:t>02.03.2016</a:t>
             </a:fld>
             <a:endParaRPr lang="pl-PL"/>
           </a:p>
@@ -3464,7 +3464,7 @@
           <a:p>
             <a:fld id="{81510C6D-7297-4447-BBEB-86B1A2F0C3D1}" type="datetimeFigureOut">
               <a:rPr lang="pl-PL" smtClean="0"/>
-              <a:t>21.02.2016</a:t>
+              <a:t>02.03.2016</a:t>
             </a:fld>
             <a:endParaRPr lang="pl-PL"/>
           </a:p>
@@ -3838,7 +3838,7 @@
           <a:p>
             <a:fld id="{81510C6D-7297-4447-BBEB-86B1A2F0C3D1}" type="datetimeFigureOut">
               <a:rPr lang="pl-PL" smtClean="0"/>
-              <a:t>21.02.2016</a:t>
+              <a:t>02.03.2016</a:t>
             </a:fld>
             <a:endParaRPr lang="pl-PL"/>
           </a:p>
@@ -3961,7 +3961,7 @@
           <a:p>
             <a:fld id="{81510C6D-7297-4447-BBEB-86B1A2F0C3D1}" type="datetimeFigureOut">
               <a:rPr lang="pl-PL" smtClean="0"/>
-              <a:t>21.02.2016</a:t>
+              <a:t>02.03.2016</a:t>
             </a:fld>
             <a:endParaRPr lang="pl-PL"/>
           </a:p>
@@ -4056,7 +4056,7 @@
           <a:p>
             <a:fld id="{81510C6D-7297-4447-BBEB-86B1A2F0C3D1}" type="datetimeFigureOut">
               <a:rPr lang="pl-PL" smtClean="0"/>
-              <a:t>21.02.2016</a:t>
+              <a:t>02.03.2016</a:t>
             </a:fld>
             <a:endParaRPr lang="pl-PL"/>
           </a:p>
@@ -4311,7 +4311,7 @@
           <a:p>
             <a:fld id="{81510C6D-7297-4447-BBEB-86B1A2F0C3D1}" type="datetimeFigureOut">
               <a:rPr lang="pl-PL" smtClean="0"/>
-              <a:t>21.02.2016</a:t>
+              <a:t>02.03.2016</a:t>
             </a:fld>
             <a:endParaRPr lang="pl-PL"/>
           </a:p>
@@ -4574,7 +4574,7 @@
           <a:p>
             <a:fld id="{81510C6D-7297-4447-BBEB-86B1A2F0C3D1}" type="datetimeFigureOut">
               <a:rPr lang="pl-PL" smtClean="0"/>
-              <a:t>21.02.2016</a:t>
+              <a:t>02.03.2016</a:t>
             </a:fld>
             <a:endParaRPr lang="pl-PL"/>
           </a:p>
@@ -5317,7 +5317,7 @@
           <a:p>
             <a:fld id="{81510C6D-7297-4447-BBEB-86B1A2F0C3D1}" type="datetimeFigureOut">
               <a:rPr lang="pl-PL" smtClean="0"/>
-              <a:t>21.02.2016</a:t>
+              <a:t>02.03.2016</a:t>
             </a:fld>
             <a:endParaRPr lang="pl-PL"/>
           </a:p>
@@ -6579,6 +6579,43 @@
             </a:r>
             <a:endParaRPr lang="pl-PL" dirty="0" smtClean="0"/>
           </a:p>
+          <a:p>
+            <a:r>
+              <a:rPr lang="pl-PL" b="1" dirty="0" err="1" smtClean="0"/>
+              <a:t>Syncfusion</a:t>
+            </a:r>
+            <a:r>
+              <a:rPr lang="pl-PL" dirty="0" smtClean="0"/>
+              <a:t> / Alessandro Del Sole: </a:t>
+            </a:r>
+            <a:r>
+              <a:rPr lang="pl-PL" i="1" dirty="0" smtClean="0"/>
+              <a:t>Roslyn </a:t>
+            </a:r>
+            <a:r>
+              <a:rPr lang="pl-PL" i="1" dirty="0" err="1" smtClean="0"/>
+              <a:t>Succinctly</a:t>
+            </a:r>
+            <a:endParaRPr lang="pl-PL" i="1" dirty="0"/>
+          </a:p>
+          <a:p>
+            <a:pPr marL="457200" lvl="1" indent="0">
+              <a:buNone/>
+            </a:pPr>
+            <a:r>
+              <a:rPr lang="pl-PL" dirty="0">
+                <a:hlinkClick r:id="rId5"/>
+              </a:rPr>
+              <a:t>https://</a:t>
+            </a:r>
+            <a:r>
+              <a:rPr lang="pl-PL" dirty="0" smtClean="0">
+                <a:hlinkClick r:id="rId5"/>
+              </a:rPr>
+              <a:t>www.syncfusion.com/resources/techportal/details/ebooks/roslyn</a:t>
+            </a:r>
+            <a:endParaRPr lang="pl-PL" dirty="0" smtClean="0"/>
+          </a:p>
         </p:txBody>
       </p:sp>
     </p:spTree>

</xml_diff>